<commit_message>
WIP on demos and slides
</commit_message>
<xml_diff>
--- a/DockerTalkThatConference2018.pptx
+++ b/DockerTalkThatConference2018.pptx
@@ -264,7 +264,7 @@
           <a:p>
             <a:fld id="{DAA0E74B-1F4A-4B77-BBF3-68B0D29FA1C9}" type="datetimeFigureOut">
               <a:rPr lang="en-US" smtClean="0"/>
-              <a:t>7/30/2018</a:t>
+              <a:t>8/2/2018</a:t>
             </a:fld>
             <a:endParaRPr lang="en-US"/>
           </a:p>
@@ -429,7 +429,7 @@
           <a:p>
             <a:fld id="{3244A53B-4F0D-4715-9A43-7F4869E1A962}" type="datetimeFigureOut">
               <a:rPr lang="en-US" smtClean="0"/>
-              <a:t>7/30/2018</a:t>
+              <a:t>8/2/2018</a:t>
             </a:fld>
             <a:endParaRPr lang="en-US"/>
           </a:p>
@@ -742,16 +742,29 @@
           <a:p>
             <a:r>
               <a:rPr lang="en-US" dirty="0"/>
-              <a:t>An application needs disk IO, memory, network, </a:t>
-            </a:r>
-            <a:r>
-              <a:rPr lang="en-US" dirty="0" err="1"/>
-              <a:t>cpu</a:t>
-            </a:r>
+              <a:t>Overview of what docker is</a:t>
+            </a:r>
+          </a:p>
+          <a:p>
             <a:r>
               <a:rPr lang="en-US" dirty="0"/>
-              <a:t>. Zip doesn’t have it!</a:t>
-            </a:r>
+              <a:t>How docker runs on windows 7/10/2016</a:t>
+            </a:r>
+          </a:p>
+          <a:p>
+            <a:r>
+              <a:rPr lang="en-US" dirty="0"/>
+              <a:t>Using docker for development</a:t>
+            </a:r>
+          </a:p>
+          <a:p>
+            <a:r>
+              <a:rPr lang="en-US" dirty="0"/>
+              <a:t>Of course questions</a:t>
+            </a:r>
+          </a:p>
+          <a:p>
+            <a:endParaRPr lang="en-US" dirty="0"/>
           </a:p>
         </p:txBody>
       </p:sp>
@@ -772,6 +785,281 @@
           <a:p>
             <a:fld id="{1CD41D82-95AA-494E-9CE1-62CDE5A45BFF}" type="slidenum">
               <a:rPr lang="en-US" smtClean="0"/>
+              <a:t>2</a:t>
+            </a:fld>
+            <a:endParaRPr lang="en-US"/>
+          </a:p>
+        </p:txBody>
+      </p:sp>
+    </p:spTree>
+    <p:extLst>
+      <p:ext uri="{BB962C8B-B14F-4D97-AF65-F5344CB8AC3E}">
+        <p14:creationId xmlns:p14="http://schemas.microsoft.com/office/powerpoint/2010/main" val="1488862613"/>
+      </p:ext>
+    </p:extLst>
+  </p:cSld>
+  <p:clrMapOvr>
+    <a:masterClrMapping/>
+  </p:clrMapOvr>
+</p:notes>
+</file>
+
+<file path=ppt/notesSlides/notesSlide2.xml><?xml version="1.0" encoding="utf-8"?>
+<p:notes xmlns:a="http://schemas.openxmlformats.org/drawingml/2006/main" xmlns:r="http://schemas.openxmlformats.org/officeDocument/2006/relationships" xmlns:p="http://schemas.openxmlformats.org/presentationml/2006/main">
+  <p:cSld>
+    <p:spTree>
+      <p:nvGrpSpPr>
+        <p:cNvPr id="1" name=""/>
+        <p:cNvGrpSpPr/>
+        <p:nvPr/>
+      </p:nvGrpSpPr>
+      <p:grpSpPr>
+        <a:xfrm>
+          <a:off x="0" y="0"/>
+          <a:ext cx="0" cy="0"/>
+          <a:chOff x="0" y="0"/>
+          <a:chExt cx="0" cy="0"/>
+        </a:xfrm>
+      </p:grpSpPr>
+      <p:sp>
+        <p:nvSpPr>
+          <p:cNvPr id="2" name="Slide Image Placeholder 1"/>
+          <p:cNvSpPr>
+            <a:spLocks noGrp="1" noRot="1" noChangeAspect="1"/>
+          </p:cNvSpPr>
+          <p:nvPr>
+            <p:ph type="sldImg"/>
+          </p:nvPr>
+        </p:nvSpPr>
+        <p:spPr/>
+      </p:sp>
+      <p:sp>
+        <p:nvSpPr>
+          <p:cNvPr id="3" name="Notes Placeholder 2"/>
+          <p:cNvSpPr>
+            <a:spLocks noGrp="1"/>
+          </p:cNvSpPr>
+          <p:nvPr>
+            <p:ph type="body" idx="1"/>
+          </p:nvPr>
+        </p:nvSpPr>
+        <p:spPr/>
+        <p:txBody>
+          <a:bodyPr/>
+          <a:lstStyle/>
+          <a:p>
+            <a:r>
+              <a:rPr lang="en-US" dirty="0"/>
+              <a:t>Talk about this, and then say let’s see how we’d run a zip file</a:t>
+            </a:r>
+          </a:p>
+        </p:txBody>
+      </p:sp>
+      <p:sp>
+        <p:nvSpPr>
+          <p:cNvPr id="4" name="Slide Number Placeholder 3"/>
+          <p:cNvSpPr>
+            <a:spLocks noGrp="1"/>
+          </p:cNvSpPr>
+          <p:nvPr>
+            <p:ph type="sldNum" sz="quarter" idx="10"/>
+          </p:nvPr>
+        </p:nvSpPr>
+        <p:spPr/>
+        <p:txBody>
+          <a:bodyPr/>
+          <a:lstStyle/>
+          <a:p>
+            <a:fld id="{1CD41D82-95AA-494E-9CE1-62CDE5A45BFF}" type="slidenum">
+              <a:rPr lang="en-US" smtClean="0"/>
+              <a:t>3</a:t>
+            </a:fld>
+            <a:endParaRPr lang="en-US"/>
+          </a:p>
+        </p:txBody>
+      </p:sp>
+    </p:spTree>
+    <p:extLst>
+      <p:ext uri="{BB962C8B-B14F-4D97-AF65-F5344CB8AC3E}">
+        <p14:creationId xmlns:p14="http://schemas.microsoft.com/office/powerpoint/2010/main" val="2451270975"/>
+      </p:ext>
+    </p:extLst>
+  </p:cSld>
+  <p:clrMapOvr>
+    <a:masterClrMapping/>
+  </p:clrMapOvr>
+</p:notes>
+</file>
+
+<file path=ppt/notesSlides/notesSlide3.xml><?xml version="1.0" encoding="utf-8"?>
+<p:notes xmlns:a="http://schemas.openxmlformats.org/drawingml/2006/main" xmlns:r="http://schemas.openxmlformats.org/officeDocument/2006/relationships" xmlns:p="http://schemas.openxmlformats.org/presentationml/2006/main">
+  <p:cSld>
+    <p:spTree>
+      <p:nvGrpSpPr>
+        <p:cNvPr id="1" name=""/>
+        <p:cNvGrpSpPr/>
+        <p:nvPr/>
+      </p:nvGrpSpPr>
+      <p:grpSpPr>
+        <a:xfrm>
+          <a:off x="0" y="0"/>
+          <a:ext cx="0" cy="0"/>
+          <a:chOff x="0" y="0"/>
+          <a:chExt cx="0" cy="0"/>
+        </a:xfrm>
+      </p:grpSpPr>
+      <p:sp>
+        <p:nvSpPr>
+          <p:cNvPr id="2" name="Slide Image Placeholder 1"/>
+          <p:cNvSpPr>
+            <a:spLocks noGrp="1" noRot="1" noChangeAspect="1"/>
+          </p:cNvSpPr>
+          <p:nvPr>
+            <p:ph type="sldImg"/>
+          </p:nvPr>
+        </p:nvSpPr>
+        <p:spPr/>
+      </p:sp>
+      <p:sp>
+        <p:nvSpPr>
+          <p:cNvPr id="3" name="Notes Placeholder 2"/>
+          <p:cNvSpPr>
+            <a:spLocks noGrp="1"/>
+          </p:cNvSpPr>
+          <p:nvPr>
+            <p:ph type="body" idx="1"/>
+          </p:nvPr>
+        </p:nvSpPr>
+        <p:spPr/>
+        <p:txBody>
+          <a:bodyPr/>
+          <a:lstStyle/>
+          <a:p>
+            <a:r>
+              <a:rPr lang="en-US" dirty="0"/>
+              <a:t>We can tell docker to run something, but not a zip file. </a:t>
+            </a:r>
+          </a:p>
+          <a:p>
+            <a:r>
+              <a:rPr lang="en-US" dirty="0"/>
+              <a:t>What does an application need to run?</a:t>
+            </a:r>
+          </a:p>
+        </p:txBody>
+      </p:sp>
+      <p:sp>
+        <p:nvSpPr>
+          <p:cNvPr id="4" name="Slide Number Placeholder 3"/>
+          <p:cNvSpPr>
+            <a:spLocks noGrp="1"/>
+          </p:cNvSpPr>
+          <p:nvPr>
+            <p:ph type="sldNum" sz="quarter" idx="10"/>
+          </p:nvPr>
+        </p:nvSpPr>
+        <p:spPr/>
+        <p:txBody>
+          <a:bodyPr/>
+          <a:lstStyle/>
+          <a:p>
+            <a:fld id="{1CD41D82-95AA-494E-9CE1-62CDE5A45BFF}" type="slidenum">
+              <a:rPr lang="en-US" smtClean="0"/>
+              <a:t>4</a:t>
+            </a:fld>
+            <a:endParaRPr lang="en-US"/>
+          </a:p>
+        </p:txBody>
+      </p:sp>
+    </p:spTree>
+    <p:extLst>
+      <p:ext uri="{BB962C8B-B14F-4D97-AF65-F5344CB8AC3E}">
+        <p14:creationId xmlns:p14="http://schemas.microsoft.com/office/powerpoint/2010/main" val="1156655817"/>
+      </p:ext>
+    </p:extLst>
+  </p:cSld>
+  <p:clrMapOvr>
+    <a:masterClrMapping/>
+  </p:clrMapOvr>
+</p:notes>
+</file>
+
+<file path=ppt/notesSlides/notesSlide4.xml><?xml version="1.0" encoding="utf-8"?>
+<p:notes xmlns:a="http://schemas.openxmlformats.org/drawingml/2006/main" xmlns:r="http://schemas.openxmlformats.org/officeDocument/2006/relationships" xmlns:p="http://schemas.openxmlformats.org/presentationml/2006/main">
+  <p:cSld>
+    <p:spTree>
+      <p:nvGrpSpPr>
+        <p:cNvPr id="1" name=""/>
+        <p:cNvGrpSpPr/>
+        <p:nvPr/>
+      </p:nvGrpSpPr>
+      <p:grpSpPr>
+        <a:xfrm>
+          <a:off x="0" y="0"/>
+          <a:ext cx="0" cy="0"/>
+          <a:chOff x="0" y="0"/>
+          <a:chExt cx="0" cy="0"/>
+        </a:xfrm>
+      </p:grpSpPr>
+      <p:sp>
+        <p:nvSpPr>
+          <p:cNvPr id="2" name="Slide Image Placeholder 1"/>
+          <p:cNvSpPr>
+            <a:spLocks noGrp="1" noRot="1" noChangeAspect="1"/>
+          </p:cNvSpPr>
+          <p:nvPr>
+            <p:ph type="sldImg"/>
+          </p:nvPr>
+        </p:nvSpPr>
+        <p:spPr/>
+      </p:sp>
+      <p:sp>
+        <p:nvSpPr>
+          <p:cNvPr id="3" name="Notes Placeholder 2"/>
+          <p:cNvSpPr>
+            <a:spLocks noGrp="1"/>
+          </p:cNvSpPr>
+          <p:nvPr>
+            <p:ph type="body" idx="1"/>
+          </p:nvPr>
+        </p:nvSpPr>
+        <p:spPr/>
+        <p:txBody>
+          <a:bodyPr/>
+          <a:lstStyle/>
+          <a:p>
+            <a:r>
+              <a:rPr lang="en-US" dirty="0"/>
+              <a:t>An application needs disk IO, memory, network, </a:t>
+            </a:r>
+            <a:r>
+              <a:rPr lang="en-US" dirty="0" err="1"/>
+              <a:t>cpu</a:t>
+            </a:r>
+            <a:r>
+              <a:rPr lang="en-US" dirty="0"/>
+              <a:t>. Zip doesn’t have it!</a:t>
+            </a:r>
+          </a:p>
+        </p:txBody>
+      </p:sp>
+      <p:sp>
+        <p:nvSpPr>
+          <p:cNvPr id="4" name="Slide Number Placeholder 3"/>
+          <p:cNvSpPr>
+            <a:spLocks noGrp="1"/>
+          </p:cNvSpPr>
+          <p:nvPr>
+            <p:ph type="sldNum" sz="quarter" idx="10"/>
+          </p:nvPr>
+        </p:nvSpPr>
+        <p:spPr/>
+        <p:txBody>
+          <a:bodyPr/>
+          <a:lstStyle/>
+          <a:p>
+            <a:fld id="{1CD41D82-95AA-494E-9CE1-62CDE5A45BFF}" type="slidenum">
+              <a:rPr lang="en-US" smtClean="0"/>
               <a:t>5</a:t>
             </a:fld>
             <a:endParaRPr lang="en-US"/>
@@ -791,7 +1079,317 @@
 </p:notes>
 </file>
 
-<file path=ppt/notesSlides/notesSlide2.xml><?xml version="1.0" encoding="utf-8"?>
+<file path=ppt/notesSlides/notesSlide5.xml><?xml version="1.0" encoding="utf-8"?>
+<p:notes xmlns:a="http://schemas.openxmlformats.org/drawingml/2006/main" xmlns:r="http://schemas.openxmlformats.org/officeDocument/2006/relationships" xmlns:p="http://schemas.openxmlformats.org/presentationml/2006/main">
+  <p:cSld>
+    <p:spTree>
+      <p:nvGrpSpPr>
+        <p:cNvPr id="1" name=""/>
+        <p:cNvGrpSpPr/>
+        <p:nvPr/>
+      </p:nvGrpSpPr>
+      <p:grpSpPr>
+        <a:xfrm>
+          <a:off x="0" y="0"/>
+          <a:ext cx="0" cy="0"/>
+          <a:chOff x="0" y="0"/>
+          <a:chExt cx="0" cy="0"/>
+        </a:xfrm>
+      </p:grpSpPr>
+      <p:sp>
+        <p:nvSpPr>
+          <p:cNvPr id="2" name="Slide Image Placeholder 1"/>
+          <p:cNvSpPr>
+            <a:spLocks noGrp="1" noRot="1" noChangeAspect="1"/>
+          </p:cNvSpPr>
+          <p:nvPr>
+            <p:ph type="sldImg"/>
+          </p:nvPr>
+        </p:nvSpPr>
+        <p:spPr/>
+      </p:sp>
+      <p:sp>
+        <p:nvSpPr>
+          <p:cNvPr id="3" name="Notes Placeholder 2"/>
+          <p:cNvSpPr>
+            <a:spLocks noGrp="1"/>
+          </p:cNvSpPr>
+          <p:nvPr>
+            <p:ph type="body" idx="1"/>
+          </p:nvPr>
+        </p:nvSpPr>
+        <p:spPr/>
+        <p:txBody>
+          <a:bodyPr/>
+          <a:lstStyle/>
+          <a:p>
+            <a:r>
+              <a:rPr lang="en-US" dirty="0"/>
+              <a:t>Running in the container, the app can see only the files in the container you packaged with it and any resources you pass in at run time. </a:t>
+            </a:r>
+          </a:p>
+          <a:p>
+            <a:endParaRPr lang="en-US" dirty="0"/>
+          </a:p>
+          <a:p>
+            <a:r>
+              <a:rPr lang="en-US" dirty="0"/>
+              <a:t>Well also the kernel (</a:t>
+            </a:r>
+            <a:r>
+              <a:rPr lang="en-US" dirty="0" err="1"/>
+              <a:t>linux</a:t>
+            </a:r>
+            <a:r>
+              <a:rPr lang="en-US" dirty="0"/>
+              <a:t> or windows) resources your software libraries have access to</a:t>
+            </a:r>
+          </a:p>
+          <a:p>
+            <a:endParaRPr lang="en-US" dirty="0"/>
+          </a:p>
+          <a:p>
+            <a:r>
+              <a:rPr lang="en-US" dirty="0"/>
+              <a:t>How do we get files into the image</a:t>
+            </a:r>
+          </a:p>
+        </p:txBody>
+      </p:sp>
+      <p:sp>
+        <p:nvSpPr>
+          <p:cNvPr id="4" name="Slide Number Placeholder 3"/>
+          <p:cNvSpPr>
+            <a:spLocks noGrp="1"/>
+          </p:cNvSpPr>
+          <p:nvPr>
+            <p:ph type="sldNum" sz="quarter" idx="10"/>
+          </p:nvPr>
+        </p:nvSpPr>
+        <p:spPr/>
+        <p:txBody>
+          <a:bodyPr/>
+          <a:lstStyle/>
+          <a:p>
+            <a:fld id="{1CD41D82-95AA-494E-9CE1-62CDE5A45BFF}" type="slidenum">
+              <a:rPr lang="en-US" smtClean="0"/>
+              <a:t>7</a:t>
+            </a:fld>
+            <a:endParaRPr lang="en-US"/>
+          </a:p>
+        </p:txBody>
+      </p:sp>
+    </p:spTree>
+    <p:extLst>
+      <p:ext uri="{BB962C8B-B14F-4D97-AF65-F5344CB8AC3E}">
+        <p14:creationId xmlns:p14="http://schemas.microsoft.com/office/powerpoint/2010/main" val="1204493037"/>
+      </p:ext>
+    </p:extLst>
+  </p:cSld>
+  <p:clrMapOvr>
+    <a:masterClrMapping/>
+  </p:clrMapOvr>
+</p:notes>
+</file>
+
+<file path=ppt/notesSlides/notesSlide6.xml><?xml version="1.0" encoding="utf-8"?>
+<p:notes xmlns:a="http://schemas.openxmlformats.org/drawingml/2006/main" xmlns:r="http://schemas.openxmlformats.org/officeDocument/2006/relationships" xmlns:p="http://schemas.openxmlformats.org/presentationml/2006/main">
+  <p:cSld>
+    <p:spTree>
+      <p:nvGrpSpPr>
+        <p:cNvPr id="1" name=""/>
+        <p:cNvGrpSpPr/>
+        <p:nvPr/>
+      </p:nvGrpSpPr>
+      <p:grpSpPr>
+        <a:xfrm>
+          <a:off x="0" y="0"/>
+          <a:ext cx="0" cy="0"/>
+          <a:chOff x="0" y="0"/>
+          <a:chExt cx="0" cy="0"/>
+        </a:xfrm>
+      </p:grpSpPr>
+      <p:sp>
+        <p:nvSpPr>
+          <p:cNvPr id="2" name="Slide Image Placeholder 1"/>
+          <p:cNvSpPr>
+            <a:spLocks noGrp="1" noRot="1" noChangeAspect="1"/>
+          </p:cNvSpPr>
+          <p:nvPr>
+            <p:ph type="sldImg"/>
+          </p:nvPr>
+        </p:nvSpPr>
+        <p:spPr/>
+      </p:sp>
+      <p:sp>
+        <p:nvSpPr>
+          <p:cNvPr id="3" name="Notes Placeholder 2"/>
+          <p:cNvSpPr>
+            <a:spLocks noGrp="1"/>
+          </p:cNvSpPr>
+          <p:nvPr>
+            <p:ph type="body" idx="1"/>
+          </p:nvPr>
+        </p:nvSpPr>
+        <p:spPr/>
+        <p:txBody>
+          <a:bodyPr/>
+          <a:lstStyle/>
+          <a:p>
+            <a:r>
+              <a:rPr lang="en-US" dirty="0"/>
+              <a:t>You saw docker run ….</a:t>
+            </a:r>
+          </a:p>
+        </p:txBody>
+      </p:sp>
+      <p:sp>
+        <p:nvSpPr>
+          <p:cNvPr id="4" name="Slide Number Placeholder 3"/>
+          <p:cNvSpPr>
+            <a:spLocks noGrp="1"/>
+          </p:cNvSpPr>
+          <p:nvPr>
+            <p:ph type="sldNum" sz="quarter" idx="10"/>
+          </p:nvPr>
+        </p:nvSpPr>
+        <p:spPr/>
+        <p:txBody>
+          <a:bodyPr/>
+          <a:lstStyle/>
+          <a:p>
+            <a:fld id="{1CD41D82-95AA-494E-9CE1-62CDE5A45BFF}" type="slidenum">
+              <a:rPr lang="en-US" smtClean="0"/>
+              <a:t>8</a:t>
+            </a:fld>
+            <a:endParaRPr lang="en-US"/>
+          </a:p>
+        </p:txBody>
+      </p:sp>
+    </p:spTree>
+    <p:extLst>
+      <p:ext uri="{BB962C8B-B14F-4D97-AF65-F5344CB8AC3E}">
+        <p14:creationId xmlns:p14="http://schemas.microsoft.com/office/powerpoint/2010/main" val="3869114510"/>
+      </p:ext>
+    </p:extLst>
+  </p:cSld>
+  <p:clrMapOvr>
+    <a:masterClrMapping/>
+  </p:clrMapOvr>
+</p:notes>
+</file>
+
+<file path=ppt/notesSlides/notesSlide7.xml><?xml version="1.0" encoding="utf-8"?>
+<p:notes xmlns:a="http://schemas.openxmlformats.org/drawingml/2006/main" xmlns:r="http://schemas.openxmlformats.org/officeDocument/2006/relationships" xmlns:p="http://schemas.openxmlformats.org/presentationml/2006/main">
+  <p:cSld>
+    <p:spTree>
+      <p:nvGrpSpPr>
+        <p:cNvPr id="1" name=""/>
+        <p:cNvGrpSpPr/>
+        <p:nvPr/>
+      </p:nvGrpSpPr>
+      <p:grpSpPr>
+        <a:xfrm>
+          <a:off x="0" y="0"/>
+          <a:ext cx="0" cy="0"/>
+          <a:chOff x="0" y="0"/>
+          <a:chExt cx="0" cy="0"/>
+        </a:xfrm>
+      </p:grpSpPr>
+      <p:sp>
+        <p:nvSpPr>
+          <p:cNvPr id="2" name="Slide Image Placeholder 1"/>
+          <p:cNvSpPr>
+            <a:spLocks noGrp="1" noRot="1" noChangeAspect="1"/>
+          </p:cNvSpPr>
+          <p:nvPr>
+            <p:ph type="sldImg"/>
+          </p:nvPr>
+        </p:nvSpPr>
+        <p:spPr/>
+      </p:sp>
+      <p:sp>
+        <p:nvSpPr>
+          <p:cNvPr id="3" name="Notes Placeholder 2"/>
+          <p:cNvSpPr>
+            <a:spLocks noGrp="1"/>
+          </p:cNvSpPr>
+          <p:nvPr>
+            <p:ph type="body" idx="1"/>
+          </p:nvPr>
+        </p:nvSpPr>
+        <p:spPr/>
+        <p:txBody>
+          <a:bodyPr/>
+          <a:lstStyle/>
+          <a:p>
+            <a:r>
+              <a:rPr lang="en-US" dirty="0"/>
+              <a:t>You can run shell commands, </a:t>
+            </a:r>
+            <a:r>
+              <a:rPr lang="en-US" dirty="0" err="1"/>
+              <a:t>powershell</a:t>
+            </a:r>
+            <a:r>
+              <a:rPr lang="en-US" dirty="0"/>
+              <a:t> (on windows), many other common operations</a:t>
+            </a:r>
+          </a:p>
+          <a:p>
+            <a:r>
+              <a:rPr lang="en-US" dirty="0"/>
+              <a:t>Each RUN/ADD command adds another layer to the image</a:t>
+            </a:r>
+          </a:p>
+          <a:p>
+            <a:endParaRPr lang="en-US" dirty="0"/>
+          </a:p>
+          <a:p>
+            <a:r>
+              <a:rPr lang="en-US" dirty="0"/>
+              <a:t>Enough on the basics of building and running!</a:t>
+            </a:r>
+          </a:p>
+        </p:txBody>
+      </p:sp>
+      <p:sp>
+        <p:nvSpPr>
+          <p:cNvPr id="4" name="Slide Number Placeholder 3"/>
+          <p:cNvSpPr>
+            <a:spLocks noGrp="1"/>
+          </p:cNvSpPr>
+          <p:nvPr>
+            <p:ph type="sldNum" sz="quarter" idx="10"/>
+          </p:nvPr>
+        </p:nvSpPr>
+        <p:spPr/>
+        <p:txBody>
+          <a:bodyPr/>
+          <a:lstStyle/>
+          <a:p>
+            <a:fld id="{1CD41D82-95AA-494E-9CE1-62CDE5A45BFF}" type="slidenum">
+              <a:rPr lang="en-US" smtClean="0"/>
+              <a:t>15</a:t>
+            </a:fld>
+            <a:endParaRPr lang="en-US"/>
+          </a:p>
+        </p:txBody>
+      </p:sp>
+    </p:spTree>
+    <p:extLst>
+      <p:ext uri="{BB962C8B-B14F-4D97-AF65-F5344CB8AC3E}">
+        <p14:creationId xmlns:p14="http://schemas.microsoft.com/office/powerpoint/2010/main" val="829937072"/>
+      </p:ext>
+    </p:extLst>
+  </p:cSld>
+  <p:clrMapOvr>
+    <a:masterClrMapping/>
+  </p:clrMapOvr>
+</p:notes>
+</file>
+
+<file path=ppt/notesSlides/notesSlide8.xml><?xml version="1.0" encoding="utf-8"?>
 <p:notes xmlns:a="http://schemas.openxmlformats.org/drawingml/2006/main" xmlns:r="http://schemas.openxmlformats.org/officeDocument/2006/relationships" xmlns:p="http://schemas.openxmlformats.org/presentationml/2006/main">
   <p:cSld>
     <p:spTree>
@@ -4326,7 +4924,7 @@
                 <a:spcPct val="150000"/>
               </a:lnSpc>
               <a:buBlip>
-                <a:blip r:embed="rId2"/>
+                <a:blip r:embed="rId3"/>
               </a:buBlip>
             </a:pPr>
             <a:r>
@@ -4349,7 +4947,7 @@
                 <a:spcPct val="150000"/>
               </a:lnSpc>
               <a:buBlip>
-                <a:blip r:embed="rId2"/>
+                <a:blip r:embed="rId3"/>
               </a:buBlip>
             </a:pPr>
             <a:r>
@@ -4372,7 +4970,7 @@
                 <a:spcPct val="150000"/>
               </a:lnSpc>
               <a:buBlip>
-                <a:blip r:embed="rId2"/>
+                <a:blip r:embed="rId3"/>
               </a:buBlip>
             </a:pPr>
             <a:r>
@@ -4405,7 +5003,7 @@
                 <a:spcPct val="150000"/>
               </a:lnSpc>
               <a:buBlip>
-                <a:blip r:embed="rId2"/>
+                <a:blip r:embed="rId3"/>
               </a:buBlip>
             </a:pPr>
             <a:r>
@@ -4433,7 +5031,7 @@
           <p:nvPr/>
         </p:nvPicPr>
         <p:blipFill>
-          <a:blip r:embed="rId3">
+          <a:blip r:embed="rId4">
             <a:extLst>
               <a:ext uri="{28A0092B-C50C-407E-A947-70E740481C1C}">
                 <a14:useLocalDpi xmlns:a14="http://schemas.microsoft.com/office/drawing/2010/main" val="0"/>
@@ -4460,14 +5058,14 @@
           <a:effectLst/>
           <a:extLst>
             <a:ext uri="{909E8E84-426E-40dd-AFC4-6F175D3DCCD1}">
-              <a14:hiddenFill xmlns="" xmlns:a14="http://schemas.microsoft.com/office/drawing/2010/main">
+              <a14:hiddenFill xmlns:a14="http://schemas.microsoft.com/office/drawing/2010/main" xmlns="">
                 <a:solidFill>
                   <a:schemeClr val="accent1"/>
                 </a:solidFill>
               </a14:hiddenFill>
             </a:ext>
             <a:ext uri="{91240B29-F687-4f45-9708-019B960494DF}">
-              <a14:hiddenLine xmlns="" xmlns:a14="http://schemas.microsoft.com/office/drawing/2010/main" w="9525">
+              <a14:hiddenLine xmlns:a14="http://schemas.microsoft.com/office/drawing/2010/main" xmlns="" w="9525">
                 <a:solidFill>
                   <a:schemeClr val="tx1"/>
                 </a:solidFill>
@@ -4477,7 +5075,7 @@
               </a14:hiddenLine>
             </a:ext>
             <a:ext uri="{AF507438-7753-43e0-B8FC-AC1667EBCBE1}">
-              <a14:hiddenEffects xmlns="" xmlns:a14="http://schemas.microsoft.com/office/drawing/2010/main">
+              <a14:hiddenEffects xmlns:a14="http://schemas.microsoft.com/office/drawing/2010/main" xmlns="">
                 <a:effectLst>
                   <a:outerShdw dist="35921" dir="2700000" algn="ctr" rotWithShape="0">
                     <a:schemeClr val="bg2"/>
@@ -8853,7 +9451,7 @@
           <p:nvPr/>
         </p:nvPicPr>
         <p:blipFill>
-          <a:blip r:embed="rId2">
+          <a:blip r:embed="rId3">
             <a:extLst>
               <a:ext uri="{28A0092B-C50C-407E-A947-70E740481C1C}">
                 <a14:useLocalDpi xmlns:a14="http://schemas.microsoft.com/office/drawing/2010/main" val="0"/>
@@ -8889,7 +9487,7 @@
           <p:nvPr/>
         </p:nvPicPr>
         <p:blipFill>
-          <a:blip r:embed="rId3">
+          <a:blip r:embed="rId4">
             <a:extLst>
               <a:ext uri="{28A0092B-C50C-407E-A947-70E740481C1C}">
                 <a14:useLocalDpi xmlns:a14="http://schemas.microsoft.com/office/drawing/2010/main" val="0"/>
@@ -17306,7 +17904,7 @@
           <p:nvPr/>
         </p:nvPicPr>
         <p:blipFill>
-          <a:blip r:embed="rId2">
+          <a:blip r:embed="rId3">
             <a:extLst>
               <a:ext uri="{28A0092B-C50C-407E-A947-70E740481C1C}">
                 <a14:useLocalDpi xmlns:a14="http://schemas.microsoft.com/office/drawing/2010/main" val="0"/>
@@ -17342,7 +17940,7 @@
           <p:nvPr/>
         </p:nvPicPr>
         <p:blipFill>
-          <a:blip r:embed="rId3">
+          <a:blip r:embed="rId4">
             <a:extLst>
               <a:ext uri="{28A0092B-C50C-407E-A947-70E740481C1C}">
                 <a14:useLocalDpi xmlns:a14="http://schemas.microsoft.com/office/drawing/2010/main" val="0"/>
@@ -17575,7 +18173,7 @@
           <p:nvPr/>
         </p:nvPicPr>
         <p:blipFill>
-          <a:blip r:embed="rId4" cstate="print">
+          <a:blip r:embed="rId5" cstate="print">
             <a:extLst>
               <a:ext uri="{28A0092B-C50C-407E-A947-70E740481C1C}">
                 <a14:useLocalDpi xmlns:a14="http://schemas.microsoft.com/office/drawing/2010/main" val="0"/>
@@ -19047,7 +19645,7 @@
           <p:nvPr/>
         </p:nvPicPr>
         <p:blipFill>
-          <a:blip r:embed="rId2">
+          <a:blip r:embed="rId3">
             <a:extLst>
               <a:ext uri="{28A0092B-C50C-407E-A947-70E740481C1C}">
                 <a14:useLocalDpi xmlns:a14="http://schemas.microsoft.com/office/drawing/2010/main" val="0"/>
@@ -19083,7 +19681,7 @@
           <p:nvPr/>
         </p:nvPicPr>
         <p:blipFill>
-          <a:blip r:embed="rId3">
+          <a:blip r:embed="rId4">
             <a:extLst>
               <a:ext uri="{28A0092B-C50C-407E-A947-70E740481C1C}">
                 <a14:useLocalDpi xmlns:a14="http://schemas.microsoft.com/office/drawing/2010/main" val="0"/>
@@ -19316,7 +19914,7 @@
           <p:nvPr/>
         </p:nvPicPr>
         <p:blipFill>
-          <a:blip r:embed="rId4">
+          <a:blip r:embed="rId5">
             <a:extLst>
               <a:ext uri="{28A0092B-C50C-407E-A947-70E740481C1C}">
                 <a14:useLocalDpi xmlns:a14="http://schemas.microsoft.com/office/drawing/2010/main" val="0"/>
@@ -19475,7 +20073,7 @@
         </p:nvSpPr>
         <p:spPr>
           <a:xfrm>
-            <a:off x="1619672" y="3789040"/>
+            <a:off x="1259632" y="2647310"/>
             <a:ext cx="5544616" cy="584775"/>
           </a:xfrm>
           <a:prstGeom prst="rect">
@@ -20765,52 +21363,6 @@
 </file>
 
 <file path=customXml/item1.xml><?xml version="1.0" encoding="utf-8"?>
-<?mso-contentType ?>
-<spe:Receivers xmlns:spe="http://schemas.microsoft.com/sharepoint/events">
-  <Receiver>
-    <Name>Document ID Generator</Name>
-    <Synchronization>Synchronous</Synchronization>
-    <Type>10001</Type>
-    <SequenceNumber>1000</SequenceNumber>
-    <Assembly>Microsoft.Office.DocumentManagement, Version=14.0.0.0, Culture=neutral, PublicKeyToken=71e9bce111e9429c</Assembly>
-    <Class>Microsoft.Office.DocumentManagement.Internal.DocIdHandler</Class>
-    <Data/>
-    <Filter/>
-  </Receiver>
-  <Receiver>
-    <Name>Document ID Generator</Name>
-    <Synchronization>Synchronous</Synchronization>
-    <Type>10002</Type>
-    <SequenceNumber>1001</SequenceNumber>
-    <Assembly>Microsoft.Office.DocumentManagement, Version=14.0.0.0, Culture=neutral, PublicKeyToken=71e9bce111e9429c</Assembly>
-    <Class>Microsoft.Office.DocumentManagement.Internal.DocIdHandler</Class>
-    <Data/>
-    <Filter/>
-  </Receiver>
-  <Receiver>
-    <Name>Document ID Generator</Name>
-    <Synchronization>Synchronous</Synchronization>
-    <Type>10004</Type>
-    <SequenceNumber>1002</SequenceNumber>
-    <Assembly>Microsoft.Office.DocumentManagement, Version=14.0.0.0, Culture=neutral, PublicKeyToken=71e9bce111e9429c</Assembly>
-    <Class>Microsoft.Office.DocumentManagement.Internal.DocIdHandler</Class>
-    <Data/>
-    <Filter/>
-  </Receiver>
-  <Receiver>
-    <Name>Document ID Generator</Name>
-    <Synchronization>Synchronous</Synchronization>
-    <Type>10006</Type>
-    <SequenceNumber>1003</SequenceNumber>
-    <Assembly>Microsoft.Office.DocumentManagement, Version=14.0.0.0, Culture=neutral, PublicKeyToken=71e9bce111e9429c</Assembly>
-    <Class>Microsoft.Office.DocumentManagement.Internal.DocIdHandler</Class>
-    <Data/>
-    <Filter/>
-  </Receiver>
-</spe:Receivers>
-</file>
-
-<file path=customXml/item2.xml><?xml version="1.0" encoding="utf-8"?>
 <ct:contentTypeSchema xmlns:ct="http://schemas.microsoft.com/office/2006/metadata/contentType" xmlns:ma="http://schemas.microsoft.com/office/2006/metadata/properties/metaAttributes" ct:_="" ma:_="" ma:contentTypeName="Document" ma:contentTypeID="0x0101003C814E62A15BFC499D1D177F88620539" ma:contentTypeVersion="0" ma:contentTypeDescription="Create a new document." ma:contentTypeScope="" ma:versionID="0aae3d0c26dcc4ca7dde2f1c7ecd0d5d">
   <xsd:schema xmlns:xsd="http://www.w3.org/2001/XMLSchema" xmlns:xs="http://www.w3.org/2001/XMLSchema" xmlns:p="http://schemas.microsoft.com/office/2006/metadata/properties" xmlns:ns2="7401d87b-50bb-41a2-9713-b7b86698e2db" targetNamespace="http://schemas.microsoft.com/office/2006/metadata/properties" ma:root="true" ma:fieldsID="6839f2fdccd6add0742fc31a91a2d782" ns2:_="">
     <xsd:import namespace="7401d87b-50bb-41a2-9713-b7b86698e2db"/>
@@ -20955,7 +21507,62 @@
 </ct:contentTypeSchema>
 </file>
 
+<file path=customXml/item2.xml><?xml version="1.0" encoding="utf-8"?>
+<?mso-contentType ?>
+<spe:Receivers xmlns:spe="http://schemas.microsoft.com/sharepoint/events">
+  <Receiver>
+    <Name>Document ID Generator</Name>
+    <Synchronization>Synchronous</Synchronization>
+    <Type>10001</Type>
+    <SequenceNumber>1000</SequenceNumber>
+    <Assembly>Microsoft.Office.DocumentManagement, Version=14.0.0.0, Culture=neutral, PublicKeyToken=71e9bce111e9429c</Assembly>
+    <Class>Microsoft.Office.DocumentManagement.Internal.DocIdHandler</Class>
+    <Data/>
+    <Filter/>
+  </Receiver>
+  <Receiver>
+    <Name>Document ID Generator</Name>
+    <Synchronization>Synchronous</Synchronization>
+    <Type>10002</Type>
+    <SequenceNumber>1001</SequenceNumber>
+    <Assembly>Microsoft.Office.DocumentManagement, Version=14.0.0.0, Culture=neutral, PublicKeyToken=71e9bce111e9429c</Assembly>
+    <Class>Microsoft.Office.DocumentManagement.Internal.DocIdHandler</Class>
+    <Data/>
+    <Filter/>
+  </Receiver>
+  <Receiver>
+    <Name>Document ID Generator</Name>
+    <Synchronization>Synchronous</Synchronization>
+    <Type>10004</Type>
+    <SequenceNumber>1002</SequenceNumber>
+    <Assembly>Microsoft.Office.DocumentManagement, Version=14.0.0.0, Culture=neutral, PublicKeyToken=71e9bce111e9429c</Assembly>
+    <Class>Microsoft.Office.DocumentManagement.Internal.DocIdHandler</Class>
+    <Data/>
+    <Filter/>
+  </Receiver>
+  <Receiver>
+    <Name>Document ID Generator</Name>
+    <Synchronization>Synchronous</Synchronization>
+    <Type>10006</Type>
+    <SequenceNumber>1003</SequenceNumber>
+    <Assembly>Microsoft.Office.DocumentManagement, Version=14.0.0.0, Culture=neutral, PublicKeyToken=71e9bce111e9429c</Assembly>
+    <Class>Microsoft.Office.DocumentManagement.Internal.DocIdHandler</Class>
+    <Data/>
+    <Filter/>
+  </Receiver>
+</spe:Receivers>
+</file>
+
 <file path=customXml/item3.xml><?xml version="1.0" encoding="utf-8"?>
+<?mso-contentType ?>
+<FormTemplates xmlns="http://schemas.microsoft.com/sharepoint/v3/contenttype/forms">
+  <Display>DocumentLibraryForm</Display>
+  <Edit>DocumentLibraryForm</Edit>
+  <New>DocumentLibraryForm</New>
+</FormTemplates>
+</file>
+
+<file path=customXml/item4.xml><?xml version="1.0" encoding="utf-8"?>
 <p:properties xmlns:p="http://schemas.microsoft.com/office/2006/metadata/properties" xmlns:xsi="http://www.w3.org/2001/XMLSchema-instance" xmlns:pc="http://schemas.microsoft.com/office/infopath/2007/PartnerControls">
   <documentManagement>
     <_dlc_DocId xmlns="7401d87b-50bb-41a2-9713-b7b86698e2db">EFQR575P25AT-64-1</_dlc_DocId>
@@ -20967,24 +21574,7 @@
 </p:properties>
 </file>
 
-<file path=customXml/item4.xml><?xml version="1.0" encoding="utf-8"?>
-<?mso-contentType ?>
-<FormTemplates xmlns="http://schemas.microsoft.com/sharepoint/v3/contenttype/forms">
-  <Display>DocumentLibraryForm</Display>
-  <Edit>DocumentLibraryForm</Edit>
-  <New>DocumentLibraryForm</New>
-</FormTemplates>
-</file>
-
 <file path=customXml/itemProps1.xml><?xml version="1.0" encoding="utf-8"?>
-<ds:datastoreItem xmlns:ds="http://schemas.openxmlformats.org/officeDocument/2006/customXml" ds:itemID="{15A09480-5AC9-4E29-A518-9861A548CC11}">
-  <ds:schemaRefs>
-    <ds:schemaRef ds:uri="http://schemas.microsoft.com/sharepoint/events"/>
-  </ds:schemaRefs>
-</ds:datastoreItem>
-</file>
-
-<file path=customXml/itemProps2.xml><?xml version="1.0" encoding="utf-8"?>
 <ds:datastoreItem xmlns:ds="http://schemas.openxmlformats.org/officeDocument/2006/customXml" ds:itemID="{E7FB682D-B298-49B7-8671-82FCAAED5F21}">
   <ds:schemaRefs>
     <ds:schemaRef ds:uri="http://schemas.microsoft.com/office/2006/metadata/contentType"/>
@@ -21002,7 +21592,23 @@
 </ds:datastoreItem>
 </file>
 
+<file path=customXml/itemProps2.xml><?xml version="1.0" encoding="utf-8"?>
+<ds:datastoreItem xmlns:ds="http://schemas.openxmlformats.org/officeDocument/2006/customXml" ds:itemID="{15A09480-5AC9-4E29-A518-9861A548CC11}">
+  <ds:schemaRefs>
+    <ds:schemaRef ds:uri="http://schemas.microsoft.com/sharepoint/events"/>
+  </ds:schemaRefs>
+</ds:datastoreItem>
+</file>
+
 <file path=customXml/itemProps3.xml><?xml version="1.0" encoding="utf-8"?>
+<ds:datastoreItem xmlns:ds="http://schemas.openxmlformats.org/officeDocument/2006/customXml" ds:itemID="{2A1B4E67-7DE9-42F0-B13B-8AB70A051549}">
+  <ds:schemaRefs>
+    <ds:schemaRef ds:uri="http://schemas.microsoft.com/sharepoint/v3/contenttype/forms"/>
+  </ds:schemaRefs>
+</ds:datastoreItem>
+</file>
+
+<file path=customXml/itemProps4.xml><?xml version="1.0" encoding="utf-8"?>
 <ds:datastoreItem xmlns:ds="http://schemas.openxmlformats.org/officeDocument/2006/customXml" ds:itemID="{7BD67557-D569-4983-8A21-1672F4EA28AB}">
   <ds:schemaRefs>
     <ds:schemaRef ds:uri="http://schemas.microsoft.com/office/2006/metadata/properties"/>
@@ -21016,12 +21622,4 @@
     <ds:schemaRef ds:uri="http://purl.org/dc/dcmitype/"/>
   </ds:schemaRefs>
 </ds:datastoreItem>
-</file>
-
-<file path=customXml/itemProps4.xml><?xml version="1.0" encoding="utf-8"?>
-<ds:datastoreItem xmlns:ds="http://schemas.openxmlformats.org/officeDocument/2006/customXml" ds:itemID="{2A1B4E67-7DE9-42F0-B13B-8AB70A051549}">
-  <ds:schemaRefs>
-    <ds:schemaRef ds:uri="http://schemas.microsoft.com/sharepoint/v3/contenttype/forms"/>
-  </ds:schemaRefs>
-</ds:datastoreItem>
 </file>
</xml_diff>